<commit_message>
Shifted the background and changed format to show 1 task per side for ease of reading with screenshots to come
Completed list of steps for 1st task
</commit_message>
<xml_diff>
--- a/Challenges.pptx
+++ b/Challenges.pptx
@@ -2906,7 +2906,7 @@
           </a:blip>
           <a:srcRect/>
           <a:stretch>
-            <a:fillRect l="-34000" t="8000" r="-102000" b="-15000"/>
+            <a:fillRect l="-34000" t="30000" r="-102000" b="-30000"/>
           </a:stretch>
         </a:blipFill>
         <a:effectLst/>
@@ -2935,9 +2935,9 @@
         <p:grpSpPr>
           <a:xfrm>
             <a:off x="0" y="2"/>
-            <a:ext cx="6858000" cy="1424064"/>
+            <a:ext cx="6858000" cy="3331027"/>
             <a:chOff x="0" y="2"/>
-            <a:chExt cx="6858000" cy="1424064"/>
+            <a:chExt cx="6858000" cy="3331027"/>
           </a:xfrm>
         </p:grpSpPr>
         <p:sp>
@@ -2949,7 +2949,7 @@
           <p:spPr>
             <a:xfrm>
               <a:off x="0" y="2"/>
-              <a:ext cx="6858000" cy="1295217"/>
+              <a:ext cx="6858000" cy="3331027"/>
             </a:xfrm>
             <a:prstGeom prst="round2SameRect">
               <a:avLst/>
@@ -3108,52 +3108,6 @@
             </a:prstGeom>
           </p:spPr>
         </p:pic>
-        <p:sp>
-          <p:nvSpPr>
-            <p:cNvPr id="10" name="Rectangle 9"/>
-            <p:cNvSpPr/>
-            <p:nvPr/>
-          </p:nvSpPr>
-          <p:spPr>
-            <a:xfrm>
-              <a:off x="2728210" y="1225973"/>
-              <a:ext cx="569626" cy="198093"/>
-            </a:xfrm>
-            <a:prstGeom prst="rect">
-              <a:avLst/>
-            </a:prstGeom>
-            <a:solidFill>
-              <a:srgbClr val="C2D5FC"/>
-            </a:solidFill>
-            <a:ln>
-              <a:noFill/>
-            </a:ln>
-          </p:spPr>
-          <p:style>
-            <a:lnRef idx="2">
-              <a:schemeClr val="accent1">
-                <a:shade val="50000"/>
-              </a:schemeClr>
-            </a:lnRef>
-            <a:fillRef idx="1">
-              <a:schemeClr val="accent1"/>
-            </a:fillRef>
-            <a:effectRef idx="0">
-              <a:schemeClr val="accent1"/>
-            </a:effectRef>
-            <a:fontRef idx="minor">
-              <a:schemeClr val="lt1"/>
-            </a:fontRef>
-          </p:style>
-          <p:txBody>
-            <a:bodyPr rtlCol="0" anchor="ctr"/>
-            <a:lstStyle/>
-            <a:p>
-              <a:pPr algn="ctr"/>
-              <a:endParaRPr lang="en-US"/>
-            </a:p>
-          </p:txBody>
-        </p:sp>
       </p:grpSp>
       <p:sp>
         <p:nvSpPr>
@@ -3163,7 +3117,7 @@
         </p:nvSpPr>
         <p:spPr>
           <a:xfrm>
-            <a:off x="0" y="1261534"/>
+            <a:off x="0" y="1250648"/>
             <a:ext cx="5766186" cy="646331"/>
           </a:xfrm>
           <a:prstGeom prst="rect">
@@ -3179,13 +3133,56 @@
           <a:p>
             <a:r>
               <a:rPr lang="en-US" dirty="0" smtClean="0"/>
-              <a:t>Try to complete as many of the programming tasks below in 10 minutes</a:t>
+              <a:t>Try to complete as many of the programming tasks in 10 minutes</a:t>
             </a:r>
             <a:r>
               <a:rPr lang="is-IS" dirty="0" smtClean="0"/>
               <a:t>…</a:t>
             </a:r>
             <a:endParaRPr lang="en-US" dirty="0"/>
+          </a:p>
+        </p:txBody>
+      </p:sp>
+      <p:sp>
+        <p:nvSpPr>
+          <p:cNvPr id="17" name="Rounded Rectangle 16"/>
+          <p:cNvSpPr/>
+          <p:nvPr/>
+        </p:nvSpPr>
+        <p:spPr>
+          <a:xfrm>
+            <a:off x="29667" y="1907863"/>
+            <a:ext cx="6784387" cy="5679479"/>
+          </a:xfrm>
+          <a:prstGeom prst="roundRect">
+            <a:avLst/>
+          </a:prstGeom>
+          <a:solidFill>
+            <a:schemeClr val="bg1"/>
+          </a:solidFill>
+        </p:spPr>
+        <p:style>
+          <a:lnRef idx="2">
+            <a:schemeClr val="accent1">
+              <a:shade val="50000"/>
+            </a:schemeClr>
+          </a:lnRef>
+          <a:fillRef idx="1">
+            <a:schemeClr val="accent1"/>
+          </a:fillRef>
+          <a:effectRef idx="0">
+            <a:schemeClr val="accent1"/>
+          </a:effectRef>
+          <a:fontRef idx="minor">
+            <a:schemeClr val="lt1"/>
+          </a:fontRef>
+        </p:style>
+        <p:txBody>
+          <a:bodyPr rtlCol="0" anchor="ctr"/>
+          <a:lstStyle/>
+          <a:p>
+            <a:pPr algn="ctr"/>
+            <a:endParaRPr lang="en-US"/>
           </a:p>
         </p:txBody>
       </p:sp>
@@ -3197,8 +3194,8 @@
         </p:nvSpPr>
         <p:spPr>
           <a:xfrm>
-            <a:off x="0" y="1907865"/>
-            <a:ext cx="6858000" cy="1200329"/>
+            <a:off x="326581" y="1874397"/>
+            <a:ext cx="4049480" cy="6032421"/>
           </a:xfrm>
           <a:prstGeom prst="rect">
             <a:avLst/>
@@ -3212,7 +3209,11 @@
           <a:lstStyle/>
           <a:p>
             <a:r>
-              <a:rPr lang="en-US" u="sng" dirty="0" smtClean="0"/>
+              <a:rPr lang="en-US" sz="1400" dirty="0" smtClean="0"/>
+              <a:t>        </a:t>
+            </a:r>
+            <a:r>
+              <a:rPr lang="en-US" sz="1400" u="sng" dirty="0" smtClean="0"/>
               <a:t>Task 1</a:t>
             </a:r>
           </a:p>
@@ -3221,17 +3222,179 @@
               <a:buAutoNum type="arabicPeriod"/>
             </a:pPr>
             <a:r>
-              <a:rPr lang="en-US" dirty="0" smtClean="0"/>
-              <a:t>Find and use the computer block to get the yellow and blue item called “</a:t>
-            </a:r>
-            <a:r>
-              <a:rPr lang="en-US" dirty="0" err="1" smtClean="0"/>
-              <a:t>hello.py</a:t>
-            </a:r>
-            <a:r>
-              <a:rPr lang="en-US" dirty="0" smtClean="0"/>
+              <a:rPr lang="en-US" sz="1400" dirty="0" smtClean="0"/>
+              <a:t>Find and right-click the computer block, then get the yellow and blue item called “</a:t>
+            </a:r>
+            <a:r>
+              <a:rPr lang="en-US" sz="1400" dirty="0" err="1" smtClean="0"/>
+              <a:t>hellominecraft</a:t>
+            </a:r>
+            <a:r>
+              <a:rPr lang="en-US" sz="1400" dirty="0" smtClean="0"/>
+              <a:t>”, this is called a script</a:t>
+            </a:r>
+          </a:p>
+          <a:p>
+            <a:pPr marL="342900" indent="-342900">
+              <a:buAutoNum type="arabicPeriod"/>
+            </a:pPr>
+            <a:endParaRPr lang="en-US" sz="1400" dirty="0" smtClean="0"/>
+          </a:p>
+          <a:p>
+            <a:pPr marL="342900" indent="-342900">
+              <a:buAutoNum type="arabicPeriod"/>
+            </a:pPr>
+            <a:endParaRPr lang="en-US" sz="1400" dirty="0" smtClean="0"/>
+          </a:p>
+          <a:p>
+            <a:pPr marL="342900" indent="-342900">
+              <a:buAutoNum type="arabicPeriod"/>
+            </a:pPr>
+            <a:r>
+              <a:rPr lang="en-US" sz="1400" dirty="0" smtClean="0"/>
+              <a:t>Right-click with the script in your hand</a:t>
+            </a:r>
+          </a:p>
+          <a:p>
+            <a:pPr marL="342900" indent="-342900">
+              <a:buAutoNum type="arabicPeriod"/>
+            </a:pPr>
+            <a:endParaRPr lang="en-US" sz="1400" dirty="0" smtClean="0"/>
+          </a:p>
+          <a:p>
+            <a:pPr marL="342900" indent="-342900">
+              <a:buAutoNum type="arabicPeriod"/>
+            </a:pPr>
+            <a:endParaRPr lang="en-US" sz="1400" dirty="0" smtClean="0"/>
+          </a:p>
+          <a:p>
+            <a:pPr marL="342900" indent="-342900">
+              <a:buAutoNum type="arabicPeriod"/>
+            </a:pPr>
+            <a:r>
+              <a:rPr lang="en-US" sz="1400" dirty="0" smtClean="0"/>
+              <a:t>Next we’ll look at the script itself, look on the right hand side of your screen</a:t>
+            </a:r>
+          </a:p>
+          <a:p>
+            <a:pPr marL="342900" indent="-342900">
+              <a:buAutoNum type="arabicPeriod"/>
+            </a:pPr>
+            <a:endParaRPr lang="en-US" sz="1400" dirty="0" smtClean="0"/>
+          </a:p>
+          <a:p>
+            <a:pPr marL="342900" indent="-342900">
+              <a:buAutoNum type="arabicPeriod"/>
+            </a:pPr>
+            <a:endParaRPr lang="en-US" sz="1400" dirty="0" smtClean="0"/>
+          </a:p>
+          <a:p>
+            <a:pPr marL="342900" indent="-342900">
+              <a:buAutoNum type="arabicPeriod"/>
+            </a:pPr>
+            <a:r>
+              <a:rPr lang="en-US" sz="1400" dirty="0" smtClean="0"/>
+              <a:t>Open the file called “</a:t>
+            </a:r>
+            <a:r>
+              <a:rPr lang="en-US" sz="1400" dirty="0" err="1" smtClean="0"/>
+              <a:t>hellominecraft.py</a:t>
+            </a:r>
+            <a:r>
+              <a:rPr lang="en-US" sz="1400" dirty="0" smtClean="0"/>
               <a:t>”</a:t>
             </a:r>
+          </a:p>
+          <a:p>
+            <a:pPr marL="342900" indent="-342900">
+              <a:buAutoNum type="arabicPeriod"/>
+            </a:pPr>
+            <a:endParaRPr lang="en-US" sz="1400" dirty="0" smtClean="0"/>
+          </a:p>
+          <a:p>
+            <a:pPr marL="342900" indent="-342900">
+              <a:buAutoNum type="arabicPeriod"/>
+            </a:pPr>
+            <a:endParaRPr lang="en-US" sz="1400" dirty="0" smtClean="0"/>
+          </a:p>
+          <a:p>
+            <a:pPr marL="342900" indent="-342900">
+              <a:buAutoNum type="arabicPeriod"/>
+            </a:pPr>
+            <a:r>
+              <a:rPr lang="en-US" sz="1400" dirty="0" smtClean="0"/>
+              <a:t>Fine the line that says “</a:t>
+            </a:r>
+            <a:r>
+              <a:rPr lang="en-US" sz="1400" dirty="0" err="1" smtClean="0"/>
+              <a:t>mc.post_to_chat</a:t>
+            </a:r>
+            <a:r>
+              <a:rPr lang="en-US" sz="1400" dirty="0" smtClean="0"/>
+              <a:t>(“Hello World!”)</a:t>
+            </a:r>
+          </a:p>
+          <a:p>
+            <a:pPr marL="342900" indent="-342900">
+              <a:buAutoNum type="arabicPeriod"/>
+            </a:pPr>
+            <a:endParaRPr lang="en-US" sz="1400" dirty="0" smtClean="0"/>
+          </a:p>
+          <a:p>
+            <a:pPr marL="342900" indent="-342900">
+              <a:buAutoNum type="arabicPeriod"/>
+            </a:pPr>
+            <a:endParaRPr lang="en-US" sz="1400" dirty="0" smtClean="0"/>
+          </a:p>
+          <a:p>
+            <a:pPr marL="342900" indent="-342900">
+              <a:buAutoNum type="arabicPeriod"/>
+            </a:pPr>
+            <a:r>
+              <a:rPr lang="en-US" sz="1400" dirty="0" smtClean="0"/>
+              <a:t>Change the word “World” to your name</a:t>
+            </a:r>
+          </a:p>
+          <a:p>
+            <a:pPr marL="342900" indent="-342900">
+              <a:buAutoNum type="arabicPeriod"/>
+            </a:pPr>
+            <a:endParaRPr lang="en-US" sz="1400" dirty="0" smtClean="0"/>
+          </a:p>
+          <a:p>
+            <a:pPr marL="342900" indent="-342900">
+              <a:buAutoNum type="arabicPeriod"/>
+            </a:pPr>
+            <a:endParaRPr lang="en-US" sz="1400" dirty="0" smtClean="0"/>
+          </a:p>
+          <a:p>
+            <a:pPr marL="342900" indent="-342900">
+              <a:buAutoNum type="arabicPeriod"/>
+            </a:pPr>
+            <a:r>
+              <a:rPr lang="en-US" sz="1400" dirty="0" smtClean="0"/>
+              <a:t>Repeat the 1</a:t>
+            </a:r>
+            <a:r>
+              <a:rPr lang="en-US" sz="1400" baseline="30000" dirty="0" smtClean="0"/>
+              <a:t>st</a:t>
+            </a:r>
+            <a:r>
+              <a:rPr lang="en-US" sz="1400" dirty="0" smtClean="0"/>
+              <a:t> and second steps, what changed?</a:t>
+            </a:r>
+          </a:p>
+          <a:p>
+            <a:pPr marL="342900" indent="-342900">
+              <a:buAutoNum type="arabicPeriod"/>
+            </a:pPr>
+            <a:endParaRPr lang="en-US" sz="1400" dirty="0" smtClean="0"/>
+          </a:p>
+          <a:p>
+            <a:pPr marL="342900" indent="-342900">
+              <a:buAutoNum type="arabicPeriod"/>
+            </a:pPr>
+            <a:endParaRPr lang="en-US" dirty="0" smtClean="0"/>
           </a:p>
           <a:p>
             <a:pPr marL="342900" indent="-342900">
@@ -3298,6 +3461,13 @@
   <p:clrMapOvr>
     <a:masterClrMapping/>
   </p:clrMapOvr>
+  <p:timing>
+    <p:tnLst>
+      <p:par>
+        <p:cTn id="1" dur="indefinite" restart="never" nodeType="tmRoot"/>
+      </p:par>
+    </p:tnLst>
+  </p:timing>
 </p:sld>
 </file>
 

</xml_diff>

<commit_message>
Added extra step to save file after editing
</commit_message>
<xml_diff>
--- a/Challenges.pptx
+++ b/Challenges.pptx
@@ -3195,7 +3195,7 @@
         <p:spPr>
           <a:xfrm>
             <a:off x="326581" y="1874397"/>
-            <a:ext cx="4049480" cy="6032421"/>
+            <a:ext cx="4049480" cy="6247864"/>
           </a:xfrm>
           <a:prstGeom prst="rect">
             <a:avLst/>
@@ -3352,7 +3352,7 @@
             </a:pPr>
             <a:r>
               <a:rPr lang="en-US" sz="1400" dirty="0" smtClean="0"/>
-              <a:t>Change the word “World” to your name</a:t>
+              <a:t>Change the word “World” to your name and save the file</a:t>
             </a:r>
           </a:p>
           <a:p>

</xml_diff>